<commit_message>
added testing to pptx
</commit_message>
<xml_diff>
--- a/Presentation.pptx
+++ b/Presentation.pptx
@@ -16,14 +16,16 @@
     <p:sldId id="274" r:id="rId10"/>
     <p:sldId id="262" r:id="rId11"/>
     <p:sldId id="276" r:id="rId12"/>
-    <p:sldId id="277" r:id="rId13"/>
-    <p:sldId id="257" r:id="rId14"/>
-    <p:sldId id="266" r:id="rId15"/>
-    <p:sldId id="265" r:id="rId16"/>
-    <p:sldId id="267" r:id="rId17"/>
-    <p:sldId id="268" r:id="rId18"/>
-    <p:sldId id="269" r:id="rId19"/>
-    <p:sldId id="278" r:id="rId20"/>
+    <p:sldId id="279" r:id="rId13"/>
+    <p:sldId id="280" r:id="rId14"/>
+    <p:sldId id="277" r:id="rId15"/>
+    <p:sldId id="257" r:id="rId16"/>
+    <p:sldId id="266" r:id="rId17"/>
+    <p:sldId id="265" r:id="rId18"/>
+    <p:sldId id="267" r:id="rId19"/>
+    <p:sldId id="268" r:id="rId20"/>
+    <p:sldId id="269" r:id="rId21"/>
+    <p:sldId id="278" r:id="rId22"/>
   </p:sldIdLst>
   <p:sldSz cx="12192000" cy="6858000"/>
   <p:notesSz cx="6858000" cy="9144000"/>
@@ -139,8 +141,7 @@
 <file path=ppt/revisionInfo.xml><?xml version="1.0" encoding="utf-8"?>
 <p1510:revInfo xmlns:a="http://schemas.openxmlformats.org/drawingml/2006/main" xmlns:r="http://schemas.openxmlformats.org/officeDocument/2006/relationships" xmlns:p1510="http://schemas.microsoft.com/office/powerpoint/2015/10/main">
   <p1510:revLst>
-    <p1510:client id="{7DA069A3-1210-4D1F-A627-9F72B107CA4C}" v="3885" dt="2023-09-06T15:53:35.850"/>
-    <p1510:client id="{B32F462A-E639-3C49-15F5-081EDC3A808C}" v="366" dt="2023-09-06T15:53:14.716"/>
+    <p1510:client id="{7DA069A3-1210-4D1F-A627-9F72B107CA4C}" v="3963" dt="2023-09-18T14:59:34.953"/>
   </p1510:revLst>
 </p1510:revInfo>
 </file>
@@ -3557,7 +3558,7 @@
           <a:p>
             <a:fld id="{846CE7D5-CF57-46EF-B807-FDD0502418D4}" type="datetimeFigureOut">
               <a:rPr lang="en-US" smtClean="0"/>
-              <a:t>9/14/2023</a:t>
+              <a:t>9/18/2023</a:t>
             </a:fld>
             <a:endParaRPr lang="en-US"/>
           </a:p>
@@ -3725,7 +3726,7 @@
           <a:p>
             <a:fld id="{846CE7D5-CF57-46EF-B807-FDD0502418D4}" type="datetimeFigureOut">
               <a:rPr lang="en-US" smtClean="0"/>
-              <a:t>9/14/2023</a:t>
+              <a:t>9/18/2023</a:t>
             </a:fld>
             <a:endParaRPr lang="en-US"/>
           </a:p>
@@ -3903,7 +3904,7 @@
           <a:p>
             <a:fld id="{846CE7D5-CF57-46EF-B807-FDD0502418D4}" type="datetimeFigureOut">
               <a:rPr lang="en-US" smtClean="0"/>
-              <a:t>9/14/2023</a:t>
+              <a:t>9/18/2023</a:t>
             </a:fld>
             <a:endParaRPr lang="en-US"/>
           </a:p>
@@ -4071,7 +4072,7 @@
           <a:p>
             <a:fld id="{846CE7D5-CF57-46EF-B807-FDD0502418D4}" type="datetimeFigureOut">
               <a:rPr lang="en-US" smtClean="0"/>
-              <a:t>9/14/2023</a:t>
+              <a:t>9/18/2023</a:t>
             </a:fld>
             <a:endParaRPr lang="en-US"/>
           </a:p>
@@ -4316,7 +4317,7 @@
           <a:p>
             <a:fld id="{846CE7D5-CF57-46EF-B807-FDD0502418D4}" type="datetimeFigureOut">
               <a:rPr lang="en-US" smtClean="0"/>
-              <a:t>9/14/2023</a:t>
+              <a:t>9/18/2023</a:t>
             </a:fld>
             <a:endParaRPr lang="en-US"/>
           </a:p>
@@ -4545,7 +4546,7 @@
           <a:p>
             <a:fld id="{846CE7D5-CF57-46EF-B807-FDD0502418D4}" type="datetimeFigureOut">
               <a:rPr lang="en-US" smtClean="0"/>
-              <a:t>9/14/2023</a:t>
+              <a:t>9/18/2023</a:t>
             </a:fld>
             <a:endParaRPr lang="en-US"/>
           </a:p>
@@ -4909,7 +4910,7 @@
           <a:p>
             <a:fld id="{846CE7D5-CF57-46EF-B807-FDD0502418D4}" type="datetimeFigureOut">
               <a:rPr lang="en-US" smtClean="0"/>
-              <a:t>9/14/2023</a:t>
+              <a:t>9/18/2023</a:t>
             </a:fld>
             <a:endParaRPr lang="en-US"/>
           </a:p>
@@ -5026,7 +5027,7 @@
           <a:p>
             <a:fld id="{846CE7D5-CF57-46EF-B807-FDD0502418D4}" type="datetimeFigureOut">
               <a:rPr lang="en-US" smtClean="0"/>
-              <a:t>9/14/2023</a:t>
+              <a:t>9/18/2023</a:t>
             </a:fld>
             <a:endParaRPr lang="en-US"/>
           </a:p>
@@ -5121,7 +5122,7 @@
           <a:p>
             <a:fld id="{846CE7D5-CF57-46EF-B807-FDD0502418D4}" type="datetimeFigureOut">
               <a:rPr lang="en-US" smtClean="0"/>
-              <a:t>9/14/2023</a:t>
+              <a:t>9/18/2023</a:t>
             </a:fld>
             <a:endParaRPr lang="en-US"/>
           </a:p>
@@ -5396,7 +5397,7 @@
           <a:p>
             <a:fld id="{846CE7D5-CF57-46EF-B807-FDD0502418D4}" type="datetimeFigureOut">
               <a:rPr lang="en-US" smtClean="0"/>
-              <a:t>9/14/2023</a:t>
+              <a:t>9/18/2023</a:t>
             </a:fld>
             <a:endParaRPr lang="en-US"/>
           </a:p>
@@ -5651,7 +5652,7 @@
           <a:p>
             <a:fld id="{846CE7D5-CF57-46EF-B807-FDD0502418D4}" type="datetimeFigureOut">
               <a:rPr lang="en-US" smtClean="0"/>
-              <a:t>9/14/2023</a:t>
+              <a:t>9/18/2023</a:t>
             </a:fld>
             <a:endParaRPr lang="en-US"/>
           </a:p>
@@ -5862,7 +5863,7 @@
           <a:p>
             <a:fld id="{846CE7D5-CF57-46EF-B807-FDD0502418D4}" type="datetimeFigureOut">
               <a:rPr lang="en-US" smtClean="0"/>
-              <a:t>9/14/2023</a:t>
+              <a:t>9/18/2023</a:t>
             </a:fld>
             <a:endParaRPr lang="en-US"/>
           </a:p>
@@ -7899,6 +7900,803 @@
     <p:bg>
       <p:bgPr>
         <a:solidFill>
+          <a:srgbClr val="262626"/>
+        </a:solidFill>
+        <a:effectLst/>
+      </p:bgPr>
+    </p:bg>
+    <p:spTree>
+      <p:nvGrpSpPr>
+        <p:cNvPr id="1" name=""/>
+        <p:cNvGrpSpPr/>
+        <p:nvPr/>
+      </p:nvGrpSpPr>
+      <p:grpSpPr>
+        <a:xfrm>
+          <a:off x="0" y="0"/>
+          <a:ext cx="0" cy="0"/>
+          <a:chOff x="0" y="0"/>
+          <a:chExt cx="0" cy="0"/>
+        </a:xfrm>
+      </p:grpSpPr>
+      <p:sp>
+        <p:nvSpPr>
+          <p:cNvPr id="16" name="Rettangolo con angoli arrotondati 15">
+            <a:extLst>
+              <a:ext uri="{FF2B5EF4-FFF2-40B4-BE49-F238E27FC236}">
+                <a16:creationId xmlns:a16="http://schemas.microsoft.com/office/drawing/2014/main" id="{32B02E17-B503-57E1-A7EE-9CA2A2B976F1}"/>
+              </a:ext>
+            </a:extLst>
+          </p:cNvPr>
+          <p:cNvSpPr/>
+          <p:nvPr/>
+        </p:nvSpPr>
+        <p:spPr>
+          <a:xfrm>
+            <a:off x="751265" y="2589929"/>
+            <a:ext cx="5640300" cy="3450653"/>
+          </a:xfrm>
+          <a:prstGeom prst="roundRect">
+            <a:avLst>
+              <a:gd name="adj" fmla="val 4520"/>
+            </a:avLst>
+          </a:prstGeom>
+          <a:solidFill>
+            <a:schemeClr val="bg1"/>
+          </a:solidFill>
+        </p:spPr>
+        <p:style>
+          <a:lnRef idx="2">
+            <a:schemeClr val="accent1">
+              <a:shade val="15000"/>
+            </a:schemeClr>
+          </a:lnRef>
+          <a:fillRef idx="1">
+            <a:schemeClr val="accent1"/>
+          </a:fillRef>
+          <a:effectRef idx="0">
+            <a:schemeClr val="accent1"/>
+          </a:effectRef>
+          <a:fontRef idx="minor">
+            <a:schemeClr val="lt1"/>
+          </a:fontRef>
+        </p:style>
+        <p:txBody>
+          <a:bodyPr rtlCol="0" anchor="ctr"/>
+          <a:lstStyle/>
+          <a:p>
+            <a:pPr algn="ctr"/>
+            <a:endParaRPr lang="it-IT"/>
+          </a:p>
+        </p:txBody>
+      </p:sp>
+      <p:sp>
+        <p:nvSpPr>
+          <p:cNvPr id="4" name="TextBox 3">
+            <a:extLst>
+              <a:ext uri="{FF2B5EF4-FFF2-40B4-BE49-F238E27FC236}">
+                <a16:creationId xmlns:a16="http://schemas.microsoft.com/office/drawing/2014/main" id="{840122AF-015F-92B7-925A-B92C3FA33A9A}"/>
+              </a:ext>
+            </a:extLst>
+          </p:cNvPr>
+          <p:cNvSpPr txBox="1"/>
+          <p:nvPr/>
+        </p:nvSpPr>
+        <p:spPr>
+          <a:xfrm>
+            <a:off x="265015" y="178593"/>
+            <a:ext cx="9700049" cy="769441"/>
+          </a:xfrm>
+          <a:prstGeom prst="rect">
+            <a:avLst/>
+          </a:prstGeom>
+          <a:noFill/>
+        </p:spPr>
+        <p:txBody>
+          <a:bodyPr rot="0" spcFirstLastPara="0" vertOverflow="overflow" horzOverflow="overflow" vert="horz" wrap="square" lIns="91440" tIns="45720" rIns="91440" bIns="45720" numCol="1" spcCol="0" rtlCol="0" fromWordArt="0" anchor="t" anchorCtr="0" forceAA="0" compatLnSpc="1">
+            <a:prstTxWarp prst="textNoShape">
+              <a:avLst/>
+            </a:prstTxWarp>
+            <a:spAutoFit/>
+          </a:bodyPr>
+          <a:lstStyle/>
+          <a:p>
+            <a:r>
+              <a:rPr lang="en-US" sz="4400" b="1" dirty="0">
+                <a:solidFill>
+                  <a:schemeClr val="bg1"/>
+                </a:solidFill>
+                <a:cs typeface="Calibri"/>
+              </a:rPr>
+              <a:t>Black box </a:t>
+            </a:r>
+            <a:r>
+              <a:rPr lang="en-US" sz="4400" b="1" dirty="0" err="1">
+                <a:solidFill>
+                  <a:schemeClr val="bg1"/>
+                </a:solidFill>
+                <a:cs typeface="Calibri"/>
+              </a:rPr>
+              <a:t>xUnit</a:t>
+            </a:r>
+            <a:r>
+              <a:rPr lang="en-US" sz="4400" b="1" dirty="0">
+                <a:solidFill>
+                  <a:schemeClr val="bg1"/>
+                </a:solidFill>
+                <a:cs typeface="Calibri"/>
+              </a:rPr>
+              <a:t> testing</a:t>
+            </a:r>
+          </a:p>
+        </p:txBody>
+      </p:sp>
+      <p:sp>
+        <p:nvSpPr>
+          <p:cNvPr id="2" name="TextBox 5">
+            <a:extLst>
+              <a:ext uri="{FF2B5EF4-FFF2-40B4-BE49-F238E27FC236}">
+                <a16:creationId xmlns:a16="http://schemas.microsoft.com/office/drawing/2014/main" id="{A87FB1E6-64DE-2213-96DD-5CE725FCF4BF}"/>
+              </a:ext>
+            </a:extLst>
+          </p:cNvPr>
+          <p:cNvSpPr txBox="1"/>
+          <p:nvPr/>
+        </p:nvSpPr>
+        <p:spPr>
+          <a:xfrm>
+            <a:off x="258807" y="1180233"/>
+            <a:ext cx="8929056" cy="584775"/>
+          </a:xfrm>
+          <a:prstGeom prst="rect">
+            <a:avLst/>
+          </a:prstGeom>
+          <a:noFill/>
+        </p:spPr>
+        <p:txBody>
+          <a:bodyPr rot="0" spcFirstLastPara="0" vertOverflow="overflow" horzOverflow="overflow" vert="horz" wrap="square" lIns="91440" tIns="45720" rIns="91440" bIns="45720" numCol="1" spcCol="0" rtlCol="0" fromWordArt="0" anchor="t" anchorCtr="0" forceAA="0" compatLnSpc="1">
+            <a:prstTxWarp prst="textNoShape">
+              <a:avLst/>
+            </a:prstTxWarp>
+            <a:spAutoFit/>
+          </a:bodyPr>
+          <a:lstStyle/>
+          <a:p>
+            <a:pPr marL="571500" indent="-571500">
+              <a:buFont typeface="Arial"/>
+              <a:buChar char="•"/>
+            </a:pPr>
+            <a:r>
+              <a:rPr lang="en-US" sz="3200" dirty="0">
+                <a:solidFill>
+                  <a:schemeClr val="accent6"/>
+                </a:solidFill>
+                <a:cs typeface="Calibri"/>
+              </a:rPr>
+              <a:t>Unit test framework: </a:t>
+            </a:r>
+            <a:r>
+              <a:rPr lang="en-US" sz="3200" b="1" dirty="0" err="1">
+                <a:solidFill>
+                  <a:srgbClr val="FCC72B"/>
+                </a:solidFill>
+                <a:cs typeface="Calibri"/>
+              </a:rPr>
+              <a:t>Vitest</a:t>
+            </a:r>
+            <a:r>
+              <a:rPr lang="en-US" sz="3200" b="1" dirty="0">
+                <a:solidFill>
+                  <a:schemeClr val="accent6"/>
+                </a:solidFill>
+                <a:cs typeface="Calibri"/>
+              </a:rPr>
+              <a:t> for React Typescript</a:t>
+            </a:r>
+          </a:p>
+        </p:txBody>
+      </p:sp>
+      <p:pic>
+        <p:nvPicPr>
+          <p:cNvPr id="5" name="Immagine 4" descr="Immagine che contiene testo, schermata, Carattere, Sistema operativo&#10;&#10;Descrizione generata automaticamente">
+            <a:extLst>
+              <a:ext uri="{FF2B5EF4-FFF2-40B4-BE49-F238E27FC236}">
+                <a16:creationId xmlns:a16="http://schemas.microsoft.com/office/drawing/2014/main" id="{C24B1AB6-0183-2E01-D8BC-0B7448F2EB04}"/>
+              </a:ext>
+            </a:extLst>
+          </p:cNvPr>
+          <p:cNvPicPr>
+            <a:picLocks noChangeAspect="1"/>
+          </p:cNvPicPr>
+          <p:nvPr/>
+        </p:nvPicPr>
+        <p:blipFill>
+          <a:blip r:embed="rId2">
+            <a:alphaModFix/>
+            <a:extLst>
+              <a:ext uri="{28A0092B-C50C-407E-A947-70E740481C1C}">
+                <a14:useLocalDpi xmlns:a14="http://schemas.microsoft.com/office/drawing/2010/main" val="0"/>
+              </a:ext>
+            </a:extLst>
+          </a:blip>
+          <a:stretch>
+            <a:fillRect/>
+          </a:stretch>
+        </p:blipFill>
+        <p:spPr>
+          <a:xfrm>
+            <a:off x="-57965" y="1765008"/>
+            <a:ext cx="7050443" cy="4860793"/>
+          </a:xfrm>
+          <a:prstGeom prst="rect">
+            <a:avLst/>
+          </a:prstGeom>
+        </p:spPr>
+      </p:pic>
+      <p:sp>
+        <p:nvSpPr>
+          <p:cNvPr id="9" name="TextBox 5">
+            <a:extLst>
+              <a:ext uri="{FF2B5EF4-FFF2-40B4-BE49-F238E27FC236}">
+                <a16:creationId xmlns:a16="http://schemas.microsoft.com/office/drawing/2014/main" id="{7572BC2D-AFA6-0638-389F-6294E7C07F94}"/>
+              </a:ext>
+            </a:extLst>
+          </p:cNvPr>
+          <p:cNvSpPr txBox="1"/>
+          <p:nvPr/>
+        </p:nvSpPr>
+        <p:spPr>
+          <a:xfrm>
+            <a:off x="6542843" y="2952535"/>
+            <a:ext cx="5138038" cy="2062103"/>
+          </a:xfrm>
+          <a:prstGeom prst="rect">
+            <a:avLst/>
+          </a:prstGeom>
+          <a:noFill/>
+        </p:spPr>
+        <p:txBody>
+          <a:bodyPr rot="0" spcFirstLastPara="0" vertOverflow="overflow" horzOverflow="overflow" vert="horz" wrap="square" lIns="91440" tIns="45720" rIns="91440" bIns="45720" numCol="1" spcCol="0" rtlCol="0" fromWordArt="0" anchor="t" anchorCtr="0" forceAA="0" compatLnSpc="1">
+            <a:prstTxWarp prst="textNoShape">
+              <a:avLst/>
+            </a:prstTxWarp>
+            <a:spAutoFit/>
+          </a:bodyPr>
+          <a:lstStyle/>
+          <a:p>
+            <a:pPr marL="571500" indent="-571500">
+              <a:buFont typeface="Arial"/>
+              <a:buChar char="•"/>
+            </a:pPr>
+            <a:r>
+              <a:rPr lang="en-US" sz="3200" dirty="0">
+                <a:solidFill>
+                  <a:srgbClr val="FCC72B"/>
+                </a:solidFill>
+                <a:cs typeface="Calibri"/>
+              </a:rPr>
+              <a:t>Veloce</a:t>
+            </a:r>
+          </a:p>
+          <a:p>
+            <a:pPr marL="571500" indent="-571500">
+              <a:buFont typeface="Arial"/>
+              <a:buChar char="•"/>
+            </a:pPr>
+            <a:r>
+              <a:rPr lang="en-US" sz="3200" dirty="0">
+                <a:solidFill>
+                  <a:srgbClr val="FCC72B"/>
+                </a:solidFill>
+                <a:cs typeface="Calibri"/>
+              </a:rPr>
+              <a:t>Facile da </a:t>
+            </a:r>
+            <a:r>
+              <a:rPr lang="en-US" sz="3200" dirty="0" err="1">
+                <a:solidFill>
+                  <a:srgbClr val="FCC72B"/>
+                </a:solidFill>
+                <a:cs typeface="Calibri"/>
+              </a:rPr>
+              <a:t>configurare</a:t>
+            </a:r>
+            <a:endParaRPr lang="en-US" sz="3200" dirty="0">
+              <a:solidFill>
+                <a:srgbClr val="FCC72B"/>
+              </a:solidFill>
+              <a:cs typeface="Calibri"/>
+            </a:endParaRPr>
+          </a:p>
+          <a:p>
+            <a:pPr marL="571500" indent="-571500">
+              <a:buFont typeface="Arial"/>
+              <a:buChar char="•"/>
+            </a:pPr>
+            <a:r>
+              <a:rPr lang="en-US" sz="3200" dirty="0">
+                <a:solidFill>
+                  <a:srgbClr val="FCC72B"/>
+                </a:solidFill>
+                <a:cs typeface="Calibri"/>
+              </a:rPr>
+              <a:t>Output </a:t>
+            </a:r>
+            <a:r>
+              <a:rPr lang="en-US" sz="3200" dirty="0" err="1">
+                <a:solidFill>
+                  <a:srgbClr val="FCC72B"/>
+                </a:solidFill>
+                <a:cs typeface="Calibri"/>
+              </a:rPr>
+              <a:t>chiaro</a:t>
+            </a:r>
+            <a:r>
+              <a:rPr lang="en-US" sz="3200" dirty="0">
+                <a:solidFill>
+                  <a:srgbClr val="FCC72B"/>
+                </a:solidFill>
+                <a:cs typeface="Calibri"/>
+              </a:rPr>
+              <a:t> e intuitive</a:t>
+            </a:r>
+          </a:p>
+          <a:p>
+            <a:pPr marL="571500" indent="-571500">
+              <a:buFont typeface="Arial"/>
+              <a:buChar char="•"/>
+            </a:pPr>
+            <a:r>
+              <a:rPr lang="en-US" sz="3200" dirty="0" err="1">
+                <a:solidFill>
+                  <a:srgbClr val="FCC72B"/>
+                </a:solidFill>
+                <a:cs typeface="Calibri"/>
+              </a:rPr>
+              <a:t>Tipato</a:t>
+            </a:r>
+            <a:r>
+              <a:rPr lang="en-US" sz="3200" dirty="0">
+                <a:solidFill>
+                  <a:srgbClr val="FCC72B"/>
+                </a:solidFill>
+                <a:cs typeface="Calibri"/>
+              </a:rPr>
+              <a:t> </a:t>
+            </a:r>
+            <a:r>
+              <a:rPr lang="en-US" sz="3200" dirty="0" err="1">
+                <a:solidFill>
+                  <a:srgbClr val="FCC72B"/>
+                </a:solidFill>
+                <a:cs typeface="Calibri"/>
+              </a:rPr>
+              <a:t>grazie</a:t>
+            </a:r>
+            <a:r>
+              <a:rPr lang="en-US" sz="3200" dirty="0">
+                <a:solidFill>
+                  <a:srgbClr val="FCC72B"/>
+                </a:solidFill>
+                <a:cs typeface="Calibri"/>
+              </a:rPr>
+              <a:t> a </a:t>
+            </a:r>
+            <a:r>
+              <a:rPr lang="en-US" sz="3200" b="1" dirty="0">
+                <a:solidFill>
+                  <a:srgbClr val="FCC72B"/>
+                </a:solidFill>
+                <a:cs typeface="Calibri"/>
+              </a:rPr>
+              <a:t>Typescript</a:t>
+            </a:r>
+          </a:p>
+        </p:txBody>
+      </p:sp>
+      <p:pic>
+        <p:nvPicPr>
+          <p:cNvPr id="14" name="Elemento grafico 13">
+            <a:extLst>
+              <a:ext uri="{FF2B5EF4-FFF2-40B4-BE49-F238E27FC236}">
+                <a16:creationId xmlns:a16="http://schemas.microsoft.com/office/drawing/2014/main" id="{4AA22751-5E9C-5166-5113-39292116C31D}"/>
+              </a:ext>
+            </a:extLst>
+          </p:cNvPr>
+          <p:cNvPicPr>
+            <a:picLocks noChangeAspect="1"/>
+          </p:cNvPicPr>
+          <p:nvPr/>
+        </p:nvPicPr>
+        <p:blipFill>
+          <a:blip r:embed="rId3">
+            <a:extLst>
+              <a:ext uri="{28A0092B-C50C-407E-A947-70E740481C1C}">
+                <a14:useLocalDpi xmlns:a14="http://schemas.microsoft.com/office/drawing/2010/main" val="0"/>
+              </a:ext>
+              <a:ext uri="{96DAC541-7B7A-43D3-8B79-37D633B846F1}">
+                <asvg:svgBlip xmlns:asvg="http://schemas.microsoft.com/office/drawing/2016/SVG/main" r:embed="rId4"/>
+              </a:ext>
+            </a:extLst>
+          </a:blip>
+          <a:stretch>
+            <a:fillRect/>
+          </a:stretch>
+        </p:blipFill>
+        <p:spPr>
+          <a:xfrm>
+            <a:off x="9187863" y="501182"/>
+            <a:ext cx="1857590" cy="1857590"/>
+          </a:xfrm>
+          <a:prstGeom prst="rect">
+            <a:avLst/>
+          </a:prstGeom>
+        </p:spPr>
+      </p:pic>
+    </p:spTree>
+    <p:extLst>
+      <p:ext uri="{BB962C8B-B14F-4D97-AF65-F5344CB8AC3E}">
+        <p14:creationId xmlns:p14="http://schemas.microsoft.com/office/powerpoint/2010/main" val="2440581059"/>
+      </p:ext>
+    </p:extLst>
+  </p:cSld>
+  <p:clrMapOvr>
+    <a:masterClrMapping/>
+  </p:clrMapOvr>
+  <mc:AlternateContent xmlns:mc="http://schemas.openxmlformats.org/markup-compatibility/2006">
+    <mc:Choice xmlns:p159="http://schemas.microsoft.com/office/powerpoint/2015/09/main" Requires="p159">
+      <p:transition xmlns:p14="http://schemas.microsoft.com/office/powerpoint/2010/main" spd="slow" p14:dur="2000">
+        <p159:morph option="byObject"/>
+      </p:transition>
+    </mc:Choice>
+    <mc:Fallback>
+      <p:transition spd="slow">
+        <p:fade/>
+      </p:transition>
+    </mc:Fallback>
+  </mc:AlternateContent>
+</p:sld>
+</file>
+
+<file path=ppt/slides/slide13.xml><?xml version="1.0" encoding="utf-8"?>
+<p:sld xmlns:a="http://schemas.openxmlformats.org/drawingml/2006/main" xmlns:r="http://schemas.openxmlformats.org/officeDocument/2006/relationships" xmlns:p="http://schemas.openxmlformats.org/presentationml/2006/main">
+  <p:cSld>
+    <p:bg>
+      <p:bgPr>
+        <a:solidFill>
+          <a:srgbClr val="262626"/>
+        </a:solidFill>
+        <a:effectLst/>
+      </p:bgPr>
+    </p:bg>
+    <p:spTree>
+      <p:nvGrpSpPr>
+        <p:cNvPr id="1" name=""/>
+        <p:cNvGrpSpPr/>
+        <p:nvPr/>
+      </p:nvGrpSpPr>
+      <p:grpSpPr>
+        <a:xfrm>
+          <a:off x="0" y="0"/>
+          <a:ext cx="0" cy="0"/>
+          <a:chOff x="0" y="0"/>
+          <a:chExt cx="0" cy="0"/>
+        </a:xfrm>
+      </p:grpSpPr>
+      <p:sp>
+        <p:nvSpPr>
+          <p:cNvPr id="4" name="TextBox 3">
+            <a:extLst>
+              <a:ext uri="{FF2B5EF4-FFF2-40B4-BE49-F238E27FC236}">
+                <a16:creationId xmlns:a16="http://schemas.microsoft.com/office/drawing/2014/main" id="{840122AF-015F-92B7-925A-B92C3FA33A9A}"/>
+              </a:ext>
+            </a:extLst>
+          </p:cNvPr>
+          <p:cNvSpPr txBox="1"/>
+          <p:nvPr/>
+        </p:nvSpPr>
+        <p:spPr>
+          <a:xfrm>
+            <a:off x="265015" y="178593"/>
+            <a:ext cx="9700049" cy="769441"/>
+          </a:xfrm>
+          <a:prstGeom prst="rect">
+            <a:avLst/>
+          </a:prstGeom>
+          <a:noFill/>
+        </p:spPr>
+        <p:txBody>
+          <a:bodyPr rot="0" spcFirstLastPara="0" vertOverflow="overflow" horzOverflow="overflow" vert="horz" wrap="square" lIns="91440" tIns="45720" rIns="91440" bIns="45720" numCol="1" spcCol="0" rtlCol="0" fromWordArt="0" anchor="t" anchorCtr="0" forceAA="0" compatLnSpc="1">
+            <a:prstTxWarp prst="textNoShape">
+              <a:avLst/>
+            </a:prstTxWarp>
+            <a:spAutoFit/>
+          </a:bodyPr>
+          <a:lstStyle/>
+          <a:p>
+            <a:r>
+              <a:rPr lang="en-US" sz="4400" b="1" dirty="0">
+                <a:solidFill>
+                  <a:schemeClr val="bg1"/>
+                </a:solidFill>
+                <a:cs typeface="Calibri"/>
+              </a:rPr>
+              <a:t>Black box </a:t>
+            </a:r>
+            <a:r>
+              <a:rPr lang="en-US" sz="4400" b="1" dirty="0" err="1">
+                <a:solidFill>
+                  <a:schemeClr val="bg1"/>
+                </a:solidFill>
+                <a:cs typeface="Calibri"/>
+              </a:rPr>
+              <a:t>xUnit</a:t>
+            </a:r>
+            <a:r>
+              <a:rPr lang="en-US" sz="4400" b="1" dirty="0">
+                <a:solidFill>
+                  <a:schemeClr val="bg1"/>
+                </a:solidFill>
+                <a:cs typeface="Calibri"/>
+              </a:rPr>
+              <a:t> testing</a:t>
+            </a:r>
+          </a:p>
+        </p:txBody>
+      </p:sp>
+      <p:sp>
+        <p:nvSpPr>
+          <p:cNvPr id="2" name="TextBox 5">
+            <a:extLst>
+              <a:ext uri="{FF2B5EF4-FFF2-40B4-BE49-F238E27FC236}">
+                <a16:creationId xmlns:a16="http://schemas.microsoft.com/office/drawing/2014/main" id="{A87FB1E6-64DE-2213-96DD-5CE725FCF4BF}"/>
+              </a:ext>
+            </a:extLst>
+          </p:cNvPr>
+          <p:cNvSpPr txBox="1"/>
+          <p:nvPr/>
+        </p:nvSpPr>
+        <p:spPr>
+          <a:xfrm>
+            <a:off x="258807" y="1180233"/>
+            <a:ext cx="8929056" cy="584775"/>
+          </a:xfrm>
+          <a:prstGeom prst="rect">
+            <a:avLst/>
+          </a:prstGeom>
+          <a:noFill/>
+        </p:spPr>
+        <p:txBody>
+          <a:bodyPr rot="0" spcFirstLastPara="0" vertOverflow="overflow" horzOverflow="overflow" vert="horz" wrap="square" lIns="91440" tIns="45720" rIns="91440" bIns="45720" numCol="1" spcCol="0" rtlCol="0" fromWordArt="0" anchor="t" anchorCtr="0" forceAA="0" compatLnSpc="1">
+            <a:prstTxWarp prst="textNoShape">
+              <a:avLst/>
+            </a:prstTxWarp>
+            <a:spAutoFit/>
+          </a:bodyPr>
+          <a:lstStyle/>
+          <a:p>
+            <a:pPr marL="571500" indent="-571500">
+              <a:buFont typeface="Arial"/>
+              <a:buChar char="•"/>
+            </a:pPr>
+            <a:r>
+              <a:rPr lang="en-US" sz="3200" dirty="0">
+                <a:solidFill>
+                  <a:schemeClr val="accent6"/>
+                </a:solidFill>
+                <a:cs typeface="Calibri"/>
+              </a:rPr>
+              <a:t>Unit test framework: </a:t>
+            </a:r>
+            <a:r>
+              <a:rPr lang="en-US" sz="3200" b="1" dirty="0" err="1">
+                <a:solidFill>
+                  <a:srgbClr val="FCC72B"/>
+                </a:solidFill>
+                <a:cs typeface="Calibri"/>
+              </a:rPr>
+              <a:t>Vitest</a:t>
+            </a:r>
+            <a:r>
+              <a:rPr lang="en-US" sz="3200" b="1" dirty="0">
+                <a:solidFill>
+                  <a:schemeClr val="accent6"/>
+                </a:solidFill>
+                <a:cs typeface="Calibri"/>
+              </a:rPr>
+              <a:t> for React Typescript</a:t>
+            </a:r>
+          </a:p>
+        </p:txBody>
+      </p:sp>
+      <p:sp>
+        <p:nvSpPr>
+          <p:cNvPr id="9" name="TextBox 5">
+            <a:extLst>
+              <a:ext uri="{FF2B5EF4-FFF2-40B4-BE49-F238E27FC236}">
+                <a16:creationId xmlns:a16="http://schemas.microsoft.com/office/drawing/2014/main" id="{7572BC2D-AFA6-0638-389F-6294E7C07F94}"/>
+              </a:ext>
+            </a:extLst>
+          </p:cNvPr>
+          <p:cNvSpPr txBox="1"/>
+          <p:nvPr/>
+        </p:nvSpPr>
+        <p:spPr>
+          <a:xfrm>
+            <a:off x="3852966" y="2358772"/>
+            <a:ext cx="4215683" cy="707886"/>
+          </a:xfrm>
+          <a:prstGeom prst="rect">
+            <a:avLst/>
+          </a:prstGeom>
+          <a:noFill/>
+        </p:spPr>
+        <p:txBody>
+          <a:bodyPr rot="0" spcFirstLastPara="0" vertOverflow="overflow" horzOverflow="overflow" vert="horz" wrap="square" lIns="91440" tIns="45720" rIns="91440" bIns="45720" numCol="1" spcCol="0" rtlCol="0" fromWordArt="0" anchor="t" anchorCtr="0" forceAA="0" compatLnSpc="1">
+            <a:prstTxWarp prst="textNoShape">
+              <a:avLst/>
+            </a:prstTxWarp>
+            <a:spAutoFit/>
+          </a:bodyPr>
+          <a:lstStyle/>
+          <a:p>
+            <a:r>
+              <a:rPr lang="en-US" sz="4000" b="1" dirty="0" err="1">
+                <a:solidFill>
+                  <a:srgbClr val="FCC72B"/>
+                </a:solidFill>
+                <a:cs typeface="Calibri"/>
+              </a:rPr>
+              <a:t>Esempio</a:t>
+            </a:r>
+            <a:r>
+              <a:rPr lang="en-US" sz="4000" b="1" dirty="0">
+                <a:solidFill>
+                  <a:srgbClr val="FCC72B"/>
+                </a:solidFill>
+                <a:cs typeface="Calibri"/>
+              </a:rPr>
+              <a:t> di output</a:t>
+            </a:r>
+          </a:p>
+        </p:txBody>
+      </p:sp>
+      <p:pic>
+        <p:nvPicPr>
+          <p:cNvPr id="14" name="Elemento grafico 13">
+            <a:extLst>
+              <a:ext uri="{FF2B5EF4-FFF2-40B4-BE49-F238E27FC236}">
+                <a16:creationId xmlns:a16="http://schemas.microsoft.com/office/drawing/2014/main" id="{4AA22751-5E9C-5166-5113-39292116C31D}"/>
+              </a:ext>
+            </a:extLst>
+          </p:cNvPr>
+          <p:cNvPicPr>
+            <a:picLocks noChangeAspect="1"/>
+          </p:cNvPicPr>
+          <p:nvPr/>
+        </p:nvPicPr>
+        <p:blipFill>
+          <a:blip r:embed="rId2">
+            <a:extLst>
+              <a:ext uri="{28A0092B-C50C-407E-A947-70E740481C1C}">
+                <a14:useLocalDpi xmlns:a14="http://schemas.microsoft.com/office/drawing/2010/main" val="0"/>
+              </a:ext>
+              <a:ext uri="{96DAC541-7B7A-43D3-8B79-37D633B846F1}">
+                <asvg:svgBlip xmlns:asvg="http://schemas.microsoft.com/office/drawing/2016/SVG/main" r:embed="rId3"/>
+              </a:ext>
+            </a:extLst>
+          </a:blip>
+          <a:stretch>
+            <a:fillRect/>
+          </a:stretch>
+        </p:blipFill>
+        <p:spPr>
+          <a:xfrm>
+            <a:off x="9187863" y="501182"/>
+            <a:ext cx="1857590" cy="1857590"/>
+          </a:xfrm>
+          <a:prstGeom prst="rect">
+            <a:avLst/>
+          </a:prstGeom>
+        </p:spPr>
+      </p:pic>
+      <p:pic>
+        <p:nvPicPr>
+          <p:cNvPr id="6" name="Immagine 5" descr="Immagine che contiene testo, Carattere, schermata, algebra&#10;&#10;Descrizione generata automaticamente">
+            <a:extLst>
+              <a:ext uri="{FF2B5EF4-FFF2-40B4-BE49-F238E27FC236}">
+                <a16:creationId xmlns:a16="http://schemas.microsoft.com/office/drawing/2014/main" id="{3BD71152-2A94-84A1-4034-BF468C62426F}"/>
+              </a:ext>
+            </a:extLst>
+          </p:cNvPr>
+          <p:cNvPicPr>
+            <a:picLocks noChangeAspect="1"/>
+          </p:cNvPicPr>
+          <p:nvPr/>
+        </p:nvPicPr>
+        <p:blipFill>
+          <a:blip r:embed="rId4">
+            <a:extLst>
+              <a:ext uri="{28A0092B-C50C-407E-A947-70E740481C1C}">
+                <a14:useLocalDpi xmlns:a14="http://schemas.microsoft.com/office/drawing/2010/main" val="0"/>
+              </a:ext>
+            </a:extLst>
+          </a:blip>
+          <a:stretch>
+            <a:fillRect/>
+          </a:stretch>
+        </p:blipFill>
+        <p:spPr>
+          <a:xfrm>
+            <a:off x="1477690" y="3718185"/>
+            <a:ext cx="8966237" cy="2545456"/>
+          </a:xfrm>
+          <a:prstGeom prst="snip2DiagRect">
+            <a:avLst/>
+          </a:prstGeom>
+          <a:solidFill>
+            <a:srgbClr val="FFFFFF">
+              <a:shade val="85000"/>
+            </a:srgbClr>
+          </a:solidFill>
+          <a:ln w="88900" cap="sq">
+            <a:solidFill>
+              <a:srgbClr val="FFFFFF"/>
+            </a:solidFill>
+            <a:miter lim="800000"/>
+          </a:ln>
+          <a:effectLst>
+            <a:outerShdw blurRad="88900" algn="tl" rotWithShape="0">
+              <a:srgbClr val="000000">
+                <a:alpha val="45000"/>
+              </a:srgbClr>
+            </a:outerShdw>
+          </a:effectLst>
+          <a:scene3d>
+            <a:camera prst="orthographicFront"/>
+            <a:lightRig rig="twoPt" dir="t">
+              <a:rot lat="0" lon="0" rev="7200000"/>
+            </a:lightRig>
+          </a:scene3d>
+          <a:sp3d>
+            <a:bevelT w="25400" h="19050"/>
+            <a:contourClr>
+              <a:srgbClr val="FFFFFF"/>
+            </a:contourClr>
+          </a:sp3d>
+        </p:spPr>
+      </p:pic>
+    </p:spTree>
+    <p:extLst>
+      <p:ext uri="{BB962C8B-B14F-4D97-AF65-F5344CB8AC3E}">
+        <p14:creationId xmlns:p14="http://schemas.microsoft.com/office/powerpoint/2010/main" val="3608790588"/>
+      </p:ext>
+    </p:extLst>
+  </p:cSld>
+  <p:clrMapOvr>
+    <a:masterClrMapping/>
+  </p:clrMapOvr>
+  <mc:AlternateContent xmlns:mc="http://schemas.openxmlformats.org/markup-compatibility/2006">
+    <mc:Choice xmlns:p159="http://schemas.microsoft.com/office/powerpoint/2015/09/main" Requires="p159">
+      <p:transition xmlns:p14="http://schemas.microsoft.com/office/powerpoint/2010/main" spd="slow" p14:dur="2000">
+        <p159:morph option="byObject"/>
+      </p:transition>
+    </mc:Choice>
+    <mc:Fallback>
+      <p:transition spd="slow">
+        <p:fade/>
+      </p:transition>
+    </mc:Fallback>
+  </mc:AlternateContent>
+</p:sld>
+</file>
+
+<file path=ppt/slides/slide14.xml><?xml version="1.0" encoding="utf-8"?>
+<p:sld xmlns:a="http://schemas.openxmlformats.org/drawingml/2006/main" xmlns:r="http://schemas.openxmlformats.org/officeDocument/2006/relationships" xmlns:p="http://schemas.openxmlformats.org/presentationml/2006/main">
+  <p:cSld>
+    <p:bg>
+      <p:bgPr>
+        <a:solidFill>
           <a:schemeClr val="tx1">
             <a:lumMod val="85000"/>
             <a:lumOff val="15000"/>
@@ -8167,7 +8965,7 @@
 </p:sld>
 </file>
 
-<file path=ppt/slides/slide13.xml><?xml version="1.0" encoding="utf-8"?>
+<file path=ppt/slides/slide15.xml><?xml version="1.0" encoding="utf-8"?>
 <p:sld xmlns:a="http://schemas.openxmlformats.org/drawingml/2006/main" xmlns:r="http://schemas.openxmlformats.org/officeDocument/2006/relationships" xmlns:p="http://schemas.openxmlformats.org/presentationml/2006/main">
   <p:cSld>
     <p:bg>
@@ -8267,7 +9065,7 @@
 </p:sld>
 </file>
 
-<file path=ppt/slides/slide14.xml><?xml version="1.0" encoding="utf-8"?>
+<file path=ppt/slides/slide16.xml><?xml version="1.0" encoding="utf-8"?>
 <p:sld xmlns:a="http://schemas.openxmlformats.org/drawingml/2006/main" xmlns:r="http://schemas.openxmlformats.org/officeDocument/2006/relationships" xmlns:p="http://schemas.openxmlformats.org/presentationml/2006/main">
   <p:cSld>
     <p:bg>
@@ -9397,7 +10195,7 @@
 </p:sld>
 </file>
 
-<file path=ppt/slides/slide15.xml><?xml version="1.0" encoding="utf-8"?>
+<file path=ppt/slides/slide17.xml><?xml version="1.0" encoding="utf-8"?>
 <p:sld xmlns:a="http://schemas.openxmlformats.org/drawingml/2006/main" xmlns:r="http://schemas.openxmlformats.org/officeDocument/2006/relationships" xmlns:p="http://schemas.openxmlformats.org/presentationml/2006/main">
   <p:cSld>
     <p:bg>
@@ -10257,7 +11055,7 @@
 </p:sld>
 </file>
 
-<file path=ppt/slides/slide16.xml><?xml version="1.0" encoding="utf-8"?>
+<file path=ppt/slides/slide18.xml><?xml version="1.0" encoding="utf-8"?>
 <p:sld xmlns:a="http://schemas.openxmlformats.org/drawingml/2006/main" xmlns:r="http://schemas.openxmlformats.org/officeDocument/2006/relationships" xmlns:p="http://schemas.openxmlformats.org/presentationml/2006/main">
   <p:cSld>
     <p:bg>
@@ -10938,7 +11736,7 @@
 </p:sld>
 </file>
 
-<file path=ppt/slides/slide17.xml><?xml version="1.0" encoding="utf-8"?>
+<file path=ppt/slides/slide19.xml><?xml version="1.0" encoding="utf-8"?>
 <p:sld xmlns:a="http://schemas.openxmlformats.org/drawingml/2006/main" xmlns:r="http://schemas.openxmlformats.org/officeDocument/2006/relationships" xmlns:p="http://schemas.openxmlformats.org/presentationml/2006/main">
   <p:cSld>
     <p:bg>
@@ -11684,7 +12482,447 @@
 </p:sld>
 </file>
 
-<file path=ppt/slides/slide18.xml><?xml version="1.0" encoding="utf-8"?>
+<file path=ppt/slides/slide2.xml><?xml version="1.0" encoding="utf-8"?>
+<p:sld xmlns:a="http://schemas.openxmlformats.org/drawingml/2006/main" xmlns:r="http://schemas.openxmlformats.org/officeDocument/2006/relationships" xmlns:p="http://schemas.openxmlformats.org/presentationml/2006/main">
+  <p:cSld>
+    <p:bg>
+      <p:bgPr>
+        <a:solidFill>
+          <a:schemeClr val="tx1">
+            <a:lumMod val="85000"/>
+            <a:lumOff val="15000"/>
+          </a:schemeClr>
+        </a:solidFill>
+        <a:effectLst/>
+      </p:bgPr>
+    </p:bg>
+    <p:spTree>
+      <p:nvGrpSpPr>
+        <p:cNvPr id="1" name=""/>
+        <p:cNvGrpSpPr/>
+        <p:nvPr/>
+      </p:nvGrpSpPr>
+      <p:grpSpPr>
+        <a:xfrm>
+          <a:off x="0" y="0"/>
+          <a:ext cx="0" cy="0"/>
+          <a:chOff x="0" y="0"/>
+          <a:chExt cx="0" cy="0"/>
+        </a:xfrm>
+      </p:grpSpPr>
+      <p:sp>
+        <p:nvSpPr>
+          <p:cNvPr id="4" name="TextBox 3">
+            <a:extLst>
+              <a:ext uri="{FF2B5EF4-FFF2-40B4-BE49-F238E27FC236}">
+                <a16:creationId xmlns:a16="http://schemas.microsoft.com/office/drawing/2014/main" id="{840122AF-015F-92B7-925A-B92C3FA33A9A}"/>
+              </a:ext>
+            </a:extLst>
+          </p:cNvPr>
+          <p:cNvSpPr txBox="1"/>
+          <p:nvPr/>
+        </p:nvSpPr>
+        <p:spPr>
+          <a:xfrm>
+            <a:off x="163710" y="178593"/>
+            <a:ext cx="7500936" cy="769441"/>
+          </a:xfrm>
+          <a:prstGeom prst="rect">
+            <a:avLst/>
+          </a:prstGeom>
+          <a:noFill/>
+        </p:spPr>
+        <p:txBody>
+          <a:bodyPr rot="0" spcFirstLastPara="0" vertOverflow="overflow" horzOverflow="overflow" vert="horz" wrap="square" lIns="91440" tIns="45720" rIns="91440" bIns="45720" numCol="1" spcCol="0" rtlCol="0" fromWordArt="0" anchor="t" anchorCtr="0" forceAA="0" compatLnSpc="1">
+            <a:prstTxWarp prst="textNoShape">
+              <a:avLst/>
+            </a:prstTxWarp>
+            <a:spAutoFit/>
+          </a:bodyPr>
+          <a:lstStyle/>
+          <a:p>
+            <a:r>
+              <a:rPr lang="en-US" sz="4400" b="1">
+                <a:solidFill>
+                  <a:schemeClr val="accent6"/>
+                </a:solidFill>
+                <a:cs typeface="Calibri"/>
+              </a:rPr>
+              <a:t>A chi è </a:t>
+            </a:r>
+            <a:r>
+              <a:rPr lang="en-US" sz="4400" b="1" noProof="1">
+                <a:solidFill>
+                  <a:schemeClr val="accent6"/>
+                </a:solidFill>
+                <a:cs typeface="Calibri"/>
+              </a:rPr>
+              <a:t>rivolta</a:t>
+            </a:r>
+            <a:r>
+              <a:rPr lang="en-US" sz="4400" b="1">
+                <a:solidFill>
+                  <a:schemeClr val="accent6"/>
+                </a:solidFill>
+                <a:cs typeface="Calibri"/>
+              </a:rPr>
+              <a:t> la nostra app?</a:t>
+            </a:r>
+          </a:p>
+        </p:txBody>
+      </p:sp>
+      <p:sp>
+        <p:nvSpPr>
+          <p:cNvPr id="2" name="TextBox 1">
+            <a:extLst>
+              <a:ext uri="{FF2B5EF4-FFF2-40B4-BE49-F238E27FC236}">
+                <a16:creationId xmlns:a16="http://schemas.microsoft.com/office/drawing/2014/main" id="{A04E3C99-A69E-7F60-335F-98AEE1E21616}"/>
+              </a:ext>
+            </a:extLst>
+          </p:cNvPr>
+          <p:cNvSpPr txBox="1"/>
+          <p:nvPr/>
+        </p:nvSpPr>
+        <p:spPr>
+          <a:xfrm>
+            <a:off x="159529" y="951471"/>
+            <a:ext cx="10447734" cy="1754326"/>
+          </a:xfrm>
+          <a:prstGeom prst="rect">
+            <a:avLst/>
+          </a:prstGeom>
+          <a:noFill/>
+        </p:spPr>
+        <p:txBody>
+          <a:bodyPr rot="0" spcFirstLastPara="0" vertOverflow="overflow" horzOverflow="overflow" vert="horz" wrap="square" lIns="91440" tIns="45720" rIns="91440" bIns="45720" numCol="1" spcCol="0" rtlCol="0" fromWordArt="0" anchor="t" anchorCtr="0" forceAA="0" compatLnSpc="1">
+            <a:prstTxWarp prst="textNoShape">
+              <a:avLst/>
+            </a:prstTxWarp>
+            <a:spAutoFit/>
+          </a:bodyPr>
+          <a:lstStyle/>
+          <a:p>
+            <a:r>
+              <a:rPr lang="en-US" sz="2800">
+                <a:solidFill>
+                  <a:schemeClr val="bg1"/>
+                </a:solidFill>
+                <a:cs typeface="Calibri"/>
+              </a:rPr>
+              <a:t>L’ </a:t>
+            </a:r>
+            <a:r>
+              <a:rPr lang="en-US" sz="3200">
+                <a:solidFill>
+                  <a:schemeClr val="bg1"/>
+                </a:solidFill>
+                <a:cs typeface="Calibri"/>
+              </a:rPr>
+              <a:t>app</a:t>
+            </a:r>
+            <a:r>
+              <a:rPr lang="en-US" sz="2800">
+                <a:solidFill>
+                  <a:schemeClr val="bg1"/>
+                </a:solidFill>
+                <a:cs typeface="Calibri"/>
+              </a:rPr>
+              <a:t> </a:t>
+            </a:r>
+            <a:r>
+              <a:rPr lang="en-US" sz="2800" err="1">
+                <a:solidFill>
+                  <a:schemeClr val="bg1"/>
+                </a:solidFill>
+                <a:cs typeface="Calibri"/>
+              </a:rPr>
+              <a:t>si</a:t>
+            </a:r>
+            <a:r>
+              <a:rPr lang="en-US" sz="2800">
+                <a:solidFill>
+                  <a:schemeClr val="bg1"/>
+                </a:solidFill>
+                <a:cs typeface="Calibri"/>
+              </a:rPr>
+              <a:t> </a:t>
+            </a:r>
+            <a:r>
+              <a:rPr lang="en-US" sz="2800" err="1">
+                <a:solidFill>
+                  <a:schemeClr val="bg1"/>
+                </a:solidFill>
+                <a:cs typeface="Calibri"/>
+              </a:rPr>
+              <a:t>rivolge</a:t>
+            </a:r>
+            <a:r>
+              <a:rPr lang="en-US" sz="2800">
+                <a:solidFill>
+                  <a:schemeClr val="bg1"/>
+                </a:solidFill>
+                <a:cs typeface="Calibri"/>
+              </a:rPr>
+              <a:t> ai </a:t>
+            </a:r>
+            <a:r>
+              <a:rPr lang="en-US" sz="2800" b="1" err="1">
+                <a:solidFill>
+                  <a:schemeClr val="accent6"/>
+                </a:solidFill>
+                <a:cs typeface="Calibri"/>
+              </a:rPr>
+              <a:t>gestori</a:t>
+            </a:r>
+            <a:r>
+              <a:rPr lang="en-US" sz="2800" b="1">
+                <a:solidFill>
+                  <a:schemeClr val="accent6"/>
+                </a:solidFill>
+                <a:cs typeface="Calibri"/>
+              </a:rPr>
+              <a:t> </a:t>
+            </a:r>
+            <a:r>
+              <a:rPr lang="en-US" sz="2800" b="1" err="1">
+                <a:solidFill>
+                  <a:schemeClr val="accent6"/>
+                </a:solidFill>
+                <a:cs typeface="Calibri"/>
+              </a:rPr>
+              <a:t>della</a:t>
+            </a:r>
+            <a:r>
+              <a:rPr lang="en-US" sz="2800" b="1">
+                <a:solidFill>
+                  <a:schemeClr val="accent6"/>
+                </a:solidFill>
+                <a:cs typeface="Calibri"/>
+              </a:rPr>
+              <a:t> </a:t>
+            </a:r>
+            <a:r>
+              <a:rPr lang="en-US" sz="2800" b="1" err="1">
+                <a:solidFill>
+                  <a:schemeClr val="accent6"/>
+                </a:solidFill>
+                <a:cs typeface="Calibri"/>
+              </a:rPr>
+              <a:t>ristorazione</a:t>
+            </a:r>
+            <a:r>
+              <a:rPr lang="en-US" sz="2800" b="1">
+                <a:solidFill>
+                  <a:schemeClr val="accent6"/>
+                </a:solidFill>
+                <a:cs typeface="Calibri"/>
+              </a:rPr>
+              <a:t> </a:t>
+            </a:r>
+            <a:r>
+              <a:rPr lang="en-US" sz="2800">
+                <a:solidFill>
+                  <a:schemeClr val="bg1"/>
+                </a:solidFill>
+                <a:cs typeface="Calibri"/>
+              </a:rPr>
+              <a:t>per </a:t>
+            </a:r>
+            <a:r>
+              <a:rPr lang="en-US" sz="2800" b="1" err="1">
+                <a:solidFill>
+                  <a:schemeClr val="bg1"/>
+                </a:solidFill>
+                <a:cs typeface="Calibri"/>
+              </a:rPr>
+              <a:t>monitorare</a:t>
+            </a:r>
+            <a:r>
+              <a:rPr lang="en-US" sz="2800">
+                <a:solidFill>
+                  <a:schemeClr val="bg1"/>
+                </a:solidFill>
+                <a:cs typeface="Calibri"/>
+              </a:rPr>
+              <a:t> e </a:t>
+            </a:r>
+            <a:r>
+              <a:rPr lang="en-US" sz="2800" b="1" err="1">
+                <a:solidFill>
+                  <a:schemeClr val="bg1"/>
+                </a:solidFill>
+                <a:cs typeface="Calibri"/>
+              </a:rPr>
+              <a:t>aumentare</a:t>
+            </a:r>
+            <a:r>
+              <a:rPr lang="en-US" sz="2800">
+                <a:solidFill>
+                  <a:schemeClr val="bg1"/>
+                </a:solidFill>
+                <a:cs typeface="Calibri"/>
+              </a:rPr>
+              <a:t> </a:t>
+            </a:r>
+            <a:r>
+              <a:rPr lang="en-US" sz="2800" b="1" err="1">
+                <a:solidFill>
+                  <a:schemeClr val="bg1"/>
+                </a:solidFill>
+                <a:cs typeface="Calibri"/>
+              </a:rPr>
+              <a:t>l'efficenza</a:t>
+            </a:r>
+            <a:r>
+              <a:rPr lang="en-US" sz="2800">
+                <a:solidFill>
+                  <a:schemeClr val="bg1"/>
+                </a:solidFill>
+                <a:cs typeface="Calibri"/>
+              </a:rPr>
+              <a:t> del proprio </a:t>
+            </a:r>
+            <a:r>
+              <a:rPr lang="en-US" sz="2800" err="1">
+                <a:solidFill>
+                  <a:schemeClr val="bg1"/>
+                </a:solidFill>
+                <a:cs typeface="Calibri"/>
+              </a:rPr>
+              <a:t>personale</a:t>
+            </a:r>
+            <a:r>
+              <a:rPr lang="en-US" sz="2800">
+                <a:solidFill>
+                  <a:schemeClr val="bg1"/>
+                </a:solidFill>
+                <a:cs typeface="Calibri"/>
+              </a:rPr>
+              <a:t>.</a:t>
+            </a:r>
+          </a:p>
+          <a:p>
+            <a:pPr marL="285750" indent="-285750">
+              <a:buFont typeface="Calibri"/>
+              <a:buChar char="-"/>
+            </a:pPr>
+            <a:endParaRPr lang="en-US" sz="2400">
+              <a:solidFill>
+                <a:schemeClr val="bg1"/>
+              </a:solidFill>
+              <a:cs typeface="Calibri"/>
+            </a:endParaRPr>
+          </a:p>
+          <a:p>
+            <a:pPr marL="285750" indent="-285750">
+              <a:buFont typeface="Calibri"/>
+              <a:buChar char="-"/>
+            </a:pPr>
+            <a:endParaRPr lang="en-US" sz="2400">
+              <a:solidFill>
+                <a:schemeClr val="bg1"/>
+              </a:solidFill>
+              <a:cs typeface="Calibri"/>
+            </a:endParaRPr>
+          </a:p>
+        </p:txBody>
+      </p:sp>
+      <p:pic>
+        <p:nvPicPr>
+          <p:cNvPr id="3" name="Immagine 2" descr="Immagine che contiene schermata, clipart, Elementi grafici, design&#10;&#10;Descrizione generata automaticamente">
+            <a:extLst>
+              <a:ext uri="{FF2B5EF4-FFF2-40B4-BE49-F238E27FC236}">
+                <a16:creationId xmlns:a16="http://schemas.microsoft.com/office/drawing/2014/main" id="{7817179F-94BD-C824-83AE-02048E9F9379}"/>
+              </a:ext>
+            </a:extLst>
+          </p:cNvPr>
+          <p:cNvPicPr>
+            <a:picLocks noChangeAspect="1"/>
+          </p:cNvPicPr>
+          <p:nvPr/>
+        </p:nvPicPr>
+        <p:blipFill>
+          <a:blip r:embed="rId2">
+            <a:extLst>
+              <a:ext uri="{28A0092B-C50C-407E-A947-70E740481C1C}">
+                <a14:useLocalDpi xmlns:a14="http://schemas.microsoft.com/office/drawing/2010/main" val="0"/>
+              </a:ext>
+            </a:extLst>
+          </a:blip>
+          <a:stretch>
+            <a:fillRect/>
+          </a:stretch>
+        </p:blipFill>
+        <p:spPr>
+          <a:xfrm>
+            <a:off x="691857" y="2210577"/>
+            <a:ext cx="6038241" cy="4025494"/>
+          </a:xfrm>
+          <a:prstGeom prst="roundRect">
+            <a:avLst>
+              <a:gd name="adj" fmla="val 8594"/>
+            </a:avLst>
+          </a:prstGeom>
+          <a:solidFill>
+            <a:srgbClr val="FFFFFF">
+              <a:shade val="85000"/>
+            </a:srgbClr>
+          </a:solidFill>
+          <a:ln>
+            <a:noFill/>
+          </a:ln>
+          <a:effectLst>
+            <a:reflection blurRad="12700" stA="38000" endPos="28000" dist="5000" dir="5400000" sy="-100000" algn="bl" rotWithShape="0"/>
+          </a:effectLst>
+        </p:spPr>
+      </p:pic>
+      <p:pic>
+        <p:nvPicPr>
+          <p:cNvPr id="5" name="Picture 4" descr="A screenshot of a phone&#10;&#10;Description automatically generated">
+            <a:extLst>
+              <a:ext uri="{FF2B5EF4-FFF2-40B4-BE49-F238E27FC236}">
+                <a16:creationId xmlns:a16="http://schemas.microsoft.com/office/drawing/2014/main" id="{4EB6859A-851B-EF57-5AE3-342BAA2746F3}"/>
+              </a:ext>
+            </a:extLst>
+          </p:cNvPr>
+          <p:cNvPicPr>
+            <a:picLocks noChangeAspect="1"/>
+          </p:cNvPicPr>
+          <p:nvPr/>
+        </p:nvPicPr>
+        <p:blipFill>
+          <a:blip r:embed="rId3"/>
+          <a:stretch>
+            <a:fillRect/>
+          </a:stretch>
+        </p:blipFill>
+        <p:spPr>
+          <a:xfrm>
+            <a:off x="8903729" y="1826431"/>
+            <a:ext cx="2542424" cy="4406152"/>
+          </a:xfrm>
+          <a:prstGeom prst="rect">
+            <a:avLst/>
+          </a:prstGeom>
+        </p:spPr>
+      </p:pic>
+    </p:spTree>
+    <p:extLst>
+      <p:ext uri="{BB962C8B-B14F-4D97-AF65-F5344CB8AC3E}">
+        <p14:creationId xmlns:p14="http://schemas.microsoft.com/office/powerpoint/2010/main" val="3064031800"/>
+      </p:ext>
+    </p:extLst>
+  </p:cSld>
+  <p:clrMapOvr>
+    <a:masterClrMapping/>
+  </p:clrMapOvr>
+  <p:transition spd="slow">
+    <p:push dir="u"/>
+  </p:transition>
+</p:sld>
+</file>
+
+<file path=ppt/slides/slide20.xml><?xml version="1.0" encoding="utf-8"?>
 <p:sld xmlns:a="http://schemas.openxmlformats.org/drawingml/2006/main" xmlns:r="http://schemas.openxmlformats.org/officeDocument/2006/relationships" xmlns:p="http://schemas.openxmlformats.org/presentationml/2006/main">
   <p:cSld>
     <p:bg>
@@ -12602,7 +13840,7 @@
 </p:sld>
 </file>
 
-<file path=ppt/slides/slide19.xml><?xml version="1.0" encoding="utf-8"?>
+<file path=ppt/slides/slide21.xml><?xml version="1.0" encoding="utf-8"?>
 <p:sld xmlns:a="http://schemas.openxmlformats.org/drawingml/2006/main" xmlns:r="http://schemas.openxmlformats.org/officeDocument/2006/relationships" xmlns:p="http://schemas.openxmlformats.org/presentationml/2006/main">
   <p:cSld>
     <p:bg>
@@ -12697,446 +13935,6 @@
   <p:clrMapOvr>
     <a:masterClrMapping/>
   </p:clrMapOvr>
-</p:sld>
-</file>
-
-<file path=ppt/slides/slide2.xml><?xml version="1.0" encoding="utf-8"?>
-<p:sld xmlns:a="http://schemas.openxmlformats.org/drawingml/2006/main" xmlns:r="http://schemas.openxmlformats.org/officeDocument/2006/relationships" xmlns:p="http://schemas.openxmlformats.org/presentationml/2006/main">
-  <p:cSld>
-    <p:bg>
-      <p:bgPr>
-        <a:solidFill>
-          <a:schemeClr val="tx1">
-            <a:lumMod val="85000"/>
-            <a:lumOff val="15000"/>
-          </a:schemeClr>
-        </a:solidFill>
-        <a:effectLst/>
-      </p:bgPr>
-    </p:bg>
-    <p:spTree>
-      <p:nvGrpSpPr>
-        <p:cNvPr id="1" name=""/>
-        <p:cNvGrpSpPr/>
-        <p:nvPr/>
-      </p:nvGrpSpPr>
-      <p:grpSpPr>
-        <a:xfrm>
-          <a:off x="0" y="0"/>
-          <a:ext cx="0" cy="0"/>
-          <a:chOff x="0" y="0"/>
-          <a:chExt cx="0" cy="0"/>
-        </a:xfrm>
-      </p:grpSpPr>
-      <p:sp>
-        <p:nvSpPr>
-          <p:cNvPr id="4" name="TextBox 3">
-            <a:extLst>
-              <a:ext uri="{FF2B5EF4-FFF2-40B4-BE49-F238E27FC236}">
-                <a16:creationId xmlns:a16="http://schemas.microsoft.com/office/drawing/2014/main" id="{840122AF-015F-92B7-925A-B92C3FA33A9A}"/>
-              </a:ext>
-            </a:extLst>
-          </p:cNvPr>
-          <p:cNvSpPr txBox="1"/>
-          <p:nvPr/>
-        </p:nvSpPr>
-        <p:spPr>
-          <a:xfrm>
-            <a:off x="163710" y="178593"/>
-            <a:ext cx="7500936" cy="769441"/>
-          </a:xfrm>
-          <a:prstGeom prst="rect">
-            <a:avLst/>
-          </a:prstGeom>
-          <a:noFill/>
-        </p:spPr>
-        <p:txBody>
-          <a:bodyPr rot="0" spcFirstLastPara="0" vertOverflow="overflow" horzOverflow="overflow" vert="horz" wrap="square" lIns="91440" tIns="45720" rIns="91440" bIns="45720" numCol="1" spcCol="0" rtlCol="0" fromWordArt="0" anchor="t" anchorCtr="0" forceAA="0" compatLnSpc="1">
-            <a:prstTxWarp prst="textNoShape">
-              <a:avLst/>
-            </a:prstTxWarp>
-            <a:spAutoFit/>
-          </a:bodyPr>
-          <a:lstStyle/>
-          <a:p>
-            <a:r>
-              <a:rPr lang="en-US" sz="4400" b="1">
-                <a:solidFill>
-                  <a:schemeClr val="accent6"/>
-                </a:solidFill>
-                <a:cs typeface="Calibri"/>
-              </a:rPr>
-              <a:t>A chi è </a:t>
-            </a:r>
-            <a:r>
-              <a:rPr lang="en-US" sz="4400" b="1" noProof="1">
-                <a:solidFill>
-                  <a:schemeClr val="accent6"/>
-                </a:solidFill>
-                <a:cs typeface="Calibri"/>
-              </a:rPr>
-              <a:t>rivolta</a:t>
-            </a:r>
-            <a:r>
-              <a:rPr lang="en-US" sz="4400" b="1">
-                <a:solidFill>
-                  <a:schemeClr val="accent6"/>
-                </a:solidFill>
-                <a:cs typeface="Calibri"/>
-              </a:rPr>
-              <a:t> la nostra app?</a:t>
-            </a:r>
-          </a:p>
-        </p:txBody>
-      </p:sp>
-      <p:sp>
-        <p:nvSpPr>
-          <p:cNvPr id="2" name="TextBox 1">
-            <a:extLst>
-              <a:ext uri="{FF2B5EF4-FFF2-40B4-BE49-F238E27FC236}">
-                <a16:creationId xmlns:a16="http://schemas.microsoft.com/office/drawing/2014/main" id="{A04E3C99-A69E-7F60-335F-98AEE1E21616}"/>
-              </a:ext>
-            </a:extLst>
-          </p:cNvPr>
-          <p:cNvSpPr txBox="1"/>
-          <p:nvPr/>
-        </p:nvSpPr>
-        <p:spPr>
-          <a:xfrm>
-            <a:off x="159529" y="951471"/>
-            <a:ext cx="10447734" cy="1754326"/>
-          </a:xfrm>
-          <a:prstGeom prst="rect">
-            <a:avLst/>
-          </a:prstGeom>
-          <a:noFill/>
-        </p:spPr>
-        <p:txBody>
-          <a:bodyPr rot="0" spcFirstLastPara="0" vertOverflow="overflow" horzOverflow="overflow" vert="horz" wrap="square" lIns="91440" tIns="45720" rIns="91440" bIns="45720" numCol="1" spcCol="0" rtlCol="0" fromWordArt="0" anchor="t" anchorCtr="0" forceAA="0" compatLnSpc="1">
-            <a:prstTxWarp prst="textNoShape">
-              <a:avLst/>
-            </a:prstTxWarp>
-            <a:spAutoFit/>
-          </a:bodyPr>
-          <a:lstStyle/>
-          <a:p>
-            <a:r>
-              <a:rPr lang="en-US" sz="2800">
-                <a:solidFill>
-                  <a:schemeClr val="bg1"/>
-                </a:solidFill>
-                <a:cs typeface="Calibri"/>
-              </a:rPr>
-              <a:t>L’ </a:t>
-            </a:r>
-            <a:r>
-              <a:rPr lang="en-US" sz="3200">
-                <a:solidFill>
-                  <a:schemeClr val="bg1"/>
-                </a:solidFill>
-                <a:cs typeface="Calibri"/>
-              </a:rPr>
-              <a:t>app</a:t>
-            </a:r>
-            <a:r>
-              <a:rPr lang="en-US" sz="2800">
-                <a:solidFill>
-                  <a:schemeClr val="bg1"/>
-                </a:solidFill>
-                <a:cs typeface="Calibri"/>
-              </a:rPr>
-              <a:t> </a:t>
-            </a:r>
-            <a:r>
-              <a:rPr lang="en-US" sz="2800" err="1">
-                <a:solidFill>
-                  <a:schemeClr val="bg1"/>
-                </a:solidFill>
-                <a:cs typeface="Calibri"/>
-              </a:rPr>
-              <a:t>si</a:t>
-            </a:r>
-            <a:r>
-              <a:rPr lang="en-US" sz="2800">
-                <a:solidFill>
-                  <a:schemeClr val="bg1"/>
-                </a:solidFill>
-                <a:cs typeface="Calibri"/>
-              </a:rPr>
-              <a:t> </a:t>
-            </a:r>
-            <a:r>
-              <a:rPr lang="en-US" sz="2800" err="1">
-                <a:solidFill>
-                  <a:schemeClr val="bg1"/>
-                </a:solidFill>
-                <a:cs typeface="Calibri"/>
-              </a:rPr>
-              <a:t>rivolge</a:t>
-            </a:r>
-            <a:r>
-              <a:rPr lang="en-US" sz="2800">
-                <a:solidFill>
-                  <a:schemeClr val="bg1"/>
-                </a:solidFill>
-                <a:cs typeface="Calibri"/>
-              </a:rPr>
-              <a:t> ai </a:t>
-            </a:r>
-            <a:r>
-              <a:rPr lang="en-US" sz="2800" b="1" err="1">
-                <a:solidFill>
-                  <a:schemeClr val="accent6"/>
-                </a:solidFill>
-                <a:cs typeface="Calibri"/>
-              </a:rPr>
-              <a:t>gestori</a:t>
-            </a:r>
-            <a:r>
-              <a:rPr lang="en-US" sz="2800" b="1">
-                <a:solidFill>
-                  <a:schemeClr val="accent6"/>
-                </a:solidFill>
-                <a:cs typeface="Calibri"/>
-              </a:rPr>
-              <a:t> </a:t>
-            </a:r>
-            <a:r>
-              <a:rPr lang="en-US" sz="2800" b="1" err="1">
-                <a:solidFill>
-                  <a:schemeClr val="accent6"/>
-                </a:solidFill>
-                <a:cs typeface="Calibri"/>
-              </a:rPr>
-              <a:t>della</a:t>
-            </a:r>
-            <a:r>
-              <a:rPr lang="en-US" sz="2800" b="1">
-                <a:solidFill>
-                  <a:schemeClr val="accent6"/>
-                </a:solidFill>
-                <a:cs typeface="Calibri"/>
-              </a:rPr>
-              <a:t> </a:t>
-            </a:r>
-            <a:r>
-              <a:rPr lang="en-US" sz="2800" b="1" err="1">
-                <a:solidFill>
-                  <a:schemeClr val="accent6"/>
-                </a:solidFill>
-                <a:cs typeface="Calibri"/>
-              </a:rPr>
-              <a:t>ristorazione</a:t>
-            </a:r>
-            <a:r>
-              <a:rPr lang="en-US" sz="2800" b="1">
-                <a:solidFill>
-                  <a:schemeClr val="accent6"/>
-                </a:solidFill>
-                <a:cs typeface="Calibri"/>
-              </a:rPr>
-              <a:t> </a:t>
-            </a:r>
-            <a:r>
-              <a:rPr lang="en-US" sz="2800">
-                <a:solidFill>
-                  <a:schemeClr val="bg1"/>
-                </a:solidFill>
-                <a:cs typeface="Calibri"/>
-              </a:rPr>
-              <a:t>per </a:t>
-            </a:r>
-            <a:r>
-              <a:rPr lang="en-US" sz="2800" b="1" err="1">
-                <a:solidFill>
-                  <a:schemeClr val="bg1"/>
-                </a:solidFill>
-                <a:cs typeface="Calibri"/>
-              </a:rPr>
-              <a:t>monitorare</a:t>
-            </a:r>
-            <a:r>
-              <a:rPr lang="en-US" sz="2800">
-                <a:solidFill>
-                  <a:schemeClr val="bg1"/>
-                </a:solidFill>
-                <a:cs typeface="Calibri"/>
-              </a:rPr>
-              <a:t> e </a:t>
-            </a:r>
-            <a:r>
-              <a:rPr lang="en-US" sz="2800" b="1" err="1">
-                <a:solidFill>
-                  <a:schemeClr val="bg1"/>
-                </a:solidFill>
-                <a:cs typeface="Calibri"/>
-              </a:rPr>
-              <a:t>aumentare</a:t>
-            </a:r>
-            <a:r>
-              <a:rPr lang="en-US" sz="2800">
-                <a:solidFill>
-                  <a:schemeClr val="bg1"/>
-                </a:solidFill>
-                <a:cs typeface="Calibri"/>
-              </a:rPr>
-              <a:t> </a:t>
-            </a:r>
-            <a:r>
-              <a:rPr lang="en-US" sz="2800" b="1" err="1">
-                <a:solidFill>
-                  <a:schemeClr val="bg1"/>
-                </a:solidFill>
-                <a:cs typeface="Calibri"/>
-              </a:rPr>
-              <a:t>l'efficenza</a:t>
-            </a:r>
-            <a:r>
-              <a:rPr lang="en-US" sz="2800">
-                <a:solidFill>
-                  <a:schemeClr val="bg1"/>
-                </a:solidFill>
-                <a:cs typeface="Calibri"/>
-              </a:rPr>
-              <a:t> del proprio </a:t>
-            </a:r>
-            <a:r>
-              <a:rPr lang="en-US" sz="2800" err="1">
-                <a:solidFill>
-                  <a:schemeClr val="bg1"/>
-                </a:solidFill>
-                <a:cs typeface="Calibri"/>
-              </a:rPr>
-              <a:t>personale</a:t>
-            </a:r>
-            <a:r>
-              <a:rPr lang="en-US" sz="2800">
-                <a:solidFill>
-                  <a:schemeClr val="bg1"/>
-                </a:solidFill>
-                <a:cs typeface="Calibri"/>
-              </a:rPr>
-              <a:t>.</a:t>
-            </a:r>
-          </a:p>
-          <a:p>
-            <a:pPr marL="285750" indent="-285750">
-              <a:buFont typeface="Calibri"/>
-              <a:buChar char="-"/>
-            </a:pPr>
-            <a:endParaRPr lang="en-US" sz="2400">
-              <a:solidFill>
-                <a:schemeClr val="bg1"/>
-              </a:solidFill>
-              <a:cs typeface="Calibri"/>
-            </a:endParaRPr>
-          </a:p>
-          <a:p>
-            <a:pPr marL="285750" indent="-285750">
-              <a:buFont typeface="Calibri"/>
-              <a:buChar char="-"/>
-            </a:pPr>
-            <a:endParaRPr lang="en-US" sz="2400">
-              <a:solidFill>
-                <a:schemeClr val="bg1"/>
-              </a:solidFill>
-              <a:cs typeface="Calibri"/>
-            </a:endParaRPr>
-          </a:p>
-        </p:txBody>
-      </p:sp>
-      <p:pic>
-        <p:nvPicPr>
-          <p:cNvPr id="3" name="Immagine 2" descr="Immagine che contiene schermata, clipart, Elementi grafici, design&#10;&#10;Descrizione generata automaticamente">
-            <a:extLst>
-              <a:ext uri="{FF2B5EF4-FFF2-40B4-BE49-F238E27FC236}">
-                <a16:creationId xmlns:a16="http://schemas.microsoft.com/office/drawing/2014/main" id="{7817179F-94BD-C824-83AE-02048E9F9379}"/>
-              </a:ext>
-            </a:extLst>
-          </p:cNvPr>
-          <p:cNvPicPr>
-            <a:picLocks noChangeAspect="1"/>
-          </p:cNvPicPr>
-          <p:nvPr/>
-        </p:nvPicPr>
-        <p:blipFill>
-          <a:blip r:embed="rId2">
-            <a:extLst>
-              <a:ext uri="{28A0092B-C50C-407E-A947-70E740481C1C}">
-                <a14:useLocalDpi xmlns:a14="http://schemas.microsoft.com/office/drawing/2010/main" val="0"/>
-              </a:ext>
-            </a:extLst>
-          </a:blip>
-          <a:stretch>
-            <a:fillRect/>
-          </a:stretch>
-        </p:blipFill>
-        <p:spPr>
-          <a:xfrm>
-            <a:off x="691857" y="2210577"/>
-            <a:ext cx="6038241" cy="4025494"/>
-          </a:xfrm>
-          <a:prstGeom prst="roundRect">
-            <a:avLst>
-              <a:gd name="adj" fmla="val 8594"/>
-            </a:avLst>
-          </a:prstGeom>
-          <a:solidFill>
-            <a:srgbClr val="FFFFFF">
-              <a:shade val="85000"/>
-            </a:srgbClr>
-          </a:solidFill>
-          <a:ln>
-            <a:noFill/>
-          </a:ln>
-          <a:effectLst>
-            <a:reflection blurRad="12700" stA="38000" endPos="28000" dist="5000" dir="5400000" sy="-100000" algn="bl" rotWithShape="0"/>
-          </a:effectLst>
-        </p:spPr>
-      </p:pic>
-      <p:pic>
-        <p:nvPicPr>
-          <p:cNvPr id="5" name="Picture 4" descr="A screenshot of a phone&#10;&#10;Description automatically generated">
-            <a:extLst>
-              <a:ext uri="{FF2B5EF4-FFF2-40B4-BE49-F238E27FC236}">
-                <a16:creationId xmlns:a16="http://schemas.microsoft.com/office/drawing/2014/main" id="{4EB6859A-851B-EF57-5AE3-342BAA2746F3}"/>
-              </a:ext>
-            </a:extLst>
-          </p:cNvPr>
-          <p:cNvPicPr>
-            <a:picLocks noChangeAspect="1"/>
-          </p:cNvPicPr>
-          <p:nvPr/>
-        </p:nvPicPr>
-        <p:blipFill>
-          <a:blip r:embed="rId3"/>
-          <a:stretch>
-            <a:fillRect/>
-          </a:stretch>
-        </p:blipFill>
-        <p:spPr>
-          <a:xfrm>
-            <a:off x="8903729" y="1826431"/>
-            <a:ext cx="2542424" cy="4406152"/>
-          </a:xfrm>
-          <a:prstGeom prst="rect">
-            <a:avLst/>
-          </a:prstGeom>
-        </p:spPr>
-      </p:pic>
-    </p:spTree>
-    <p:extLst>
-      <p:ext uri="{BB962C8B-B14F-4D97-AF65-F5344CB8AC3E}">
-        <p14:creationId xmlns:p14="http://schemas.microsoft.com/office/powerpoint/2010/main" val="3064031800"/>
-      </p:ext>
-    </p:extLst>
-  </p:cSld>
-  <p:clrMapOvr>
-    <a:masterClrMapping/>
-  </p:clrMapOvr>
-  <p:transition spd="slow">
-    <p:push dir="u"/>
-  </p:transition>
 </p:sld>
 </file>
 
@@ -17843,7 +18641,7 @@
               <a:buChar char="•"/>
             </a:pPr>
             <a:r>
-              <a:rPr lang="en-US" sz="3200" err="1">
+              <a:rPr lang="en-US" sz="3200" dirty="0" err="1">
                 <a:solidFill>
                   <a:schemeClr val="bg1"/>
                 </a:solidFill>
@@ -17852,7 +18650,7 @@
               <a:t>Reattiva</a:t>
             </a:r>
             <a:r>
-              <a:rPr lang="en-US" sz="3200">
+              <a:rPr lang="en-US" sz="3200" dirty="0">
                 <a:solidFill>
                   <a:schemeClr val="bg1"/>
                 </a:solidFill>
@@ -17861,7 +18659,7 @@
               <a:t> e veloce </a:t>
             </a:r>
             <a:r>
-              <a:rPr lang="en-US" sz="3200" err="1">
+              <a:rPr lang="en-US" sz="3200" dirty="0" err="1">
                 <a:solidFill>
                   <a:schemeClr val="bg1"/>
                 </a:solidFill>
@@ -17870,7 +18668,7 @@
               <a:t>su</a:t>
             </a:r>
             <a:r>
-              <a:rPr lang="en-US" sz="3200">
+              <a:rPr lang="en-US" sz="3200" dirty="0">
                 <a:solidFill>
                   <a:schemeClr val="bg1"/>
                 </a:solidFill>
@@ -17879,7 +18677,7 @@
               <a:t> </a:t>
             </a:r>
             <a:r>
-              <a:rPr lang="en-US" sz="3200" err="1">
+              <a:rPr lang="en-US" sz="3200" dirty="0" err="1">
                 <a:solidFill>
                   <a:schemeClr val="bg1"/>
                 </a:solidFill>
@@ -17888,7 +18686,7 @@
               <a:t>più</a:t>
             </a:r>
             <a:r>
-              <a:rPr lang="en-US" sz="3200">
+              <a:rPr lang="en-US" sz="3200" dirty="0">
                 <a:solidFill>
                   <a:schemeClr val="bg1"/>
                 </a:solidFill>
@@ -17897,7 +18695,7 @@
               <a:t> </a:t>
             </a:r>
             <a:r>
-              <a:rPr lang="en-US" sz="3200" err="1">
+              <a:rPr lang="en-US" sz="3200" dirty="0" err="1">
                 <a:solidFill>
                   <a:schemeClr val="bg1"/>
                 </a:solidFill>
@@ -17905,7 +18703,7 @@
               </a:rPr>
               <a:t>dispositivi</a:t>
             </a:r>
-            <a:endParaRPr lang="en-US" sz="3200">
+            <a:endParaRPr lang="en-US" sz="3200" dirty="0">
               <a:solidFill>
                 <a:schemeClr val="bg1"/>
               </a:solidFill>
@@ -17918,7 +18716,7 @@
               <a:buChar char="•"/>
             </a:pPr>
             <a:r>
-              <a:rPr lang="en-US" sz="3200" err="1">
+              <a:rPr lang="en-US" sz="3200" dirty="0" err="1">
                 <a:solidFill>
                   <a:schemeClr val="bg1"/>
                 </a:solidFill>
@@ -17927,7 +18725,7 @@
               <a:t>Controllo</a:t>
             </a:r>
             <a:r>
-              <a:rPr lang="en-US" sz="3200">
+              <a:rPr lang="en-US" sz="3200" dirty="0">
                 <a:solidFill>
                   <a:schemeClr val="bg1"/>
                 </a:solidFill>
@@ -17936,7 +18734,7 @@
               <a:t> </a:t>
             </a:r>
             <a:r>
-              <a:rPr lang="en-US" sz="3200" err="1">
+              <a:rPr lang="en-US" sz="3200" dirty="0" err="1">
                 <a:solidFill>
                   <a:schemeClr val="bg1"/>
                 </a:solidFill>
@@ -17945,7 +18743,7 @@
               <a:t>efficienza</a:t>
             </a:r>
             <a:r>
-              <a:rPr lang="en-US" sz="3200">
+              <a:rPr lang="en-US" sz="3200" dirty="0">
                 <a:solidFill>
                   <a:schemeClr val="bg1"/>
                 </a:solidFill>
@@ -17954,7 +18752,7 @@
               <a:t> del </a:t>
             </a:r>
             <a:r>
-              <a:rPr lang="en-US" sz="3200" err="1">
+              <a:rPr lang="en-US" sz="3200" dirty="0" err="1">
                 <a:solidFill>
                   <a:schemeClr val="bg1"/>
                 </a:solidFill>
@@ -17962,7 +18760,7 @@
               </a:rPr>
               <a:t>personale</a:t>
             </a:r>
-            <a:endParaRPr lang="en-US" sz="3200">
+            <a:endParaRPr lang="en-US" sz="3200" dirty="0">
               <a:solidFill>
                 <a:schemeClr val="bg1"/>
               </a:solidFill>
@@ -17975,7 +18773,7 @@
               <a:buChar char="•"/>
             </a:pPr>
             <a:r>
-              <a:rPr lang="en-US" sz="3200" err="1">
+              <a:rPr lang="en-US" sz="3200" dirty="0" err="1">
                 <a:solidFill>
                   <a:schemeClr val="bg1"/>
                 </a:solidFill>
@@ -17984,7 +18782,7 @@
               <a:t>Prendere</a:t>
             </a:r>
             <a:r>
-              <a:rPr lang="en-US" sz="3200">
+              <a:rPr lang="en-US" sz="3200" dirty="0">
                 <a:solidFill>
                   <a:schemeClr val="bg1"/>
                 </a:solidFill>
@@ -17993,7 +18791,7 @@
               <a:t> e </a:t>
             </a:r>
             <a:r>
-              <a:rPr lang="en-US" sz="3200" err="1">
+              <a:rPr lang="en-US" sz="3200" dirty="0" err="1">
                 <a:solidFill>
                   <a:schemeClr val="bg1"/>
                 </a:solidFill>
@@ -18002,7 +18800,7 @@
               <a:t>inviare</a:t>
             </a:r>
             <a:r>
-              <a:rPr lang="en-US" sz="3200">
+              <a:rPr lang="en-US" sz="3200" dirty="0">
                 <a:solidFill>
                   <a:schemeClr val="bg1"/>
                 </a:solidFill>
@@ -18011,7 +18809,7 @@
               <a:t> </a:t>
             </a:r>
             <a:r>
-              <a:rPr lang="en-US" sz="3200" err="1">
+              <a:rPr lang="en-US" sz="3200" dirty="0" err="1">
                 <a:solidFill>
                   <a:schemeClr val="bg1"/>
                 </a:solidFill>
@@ -18020,7 +18818,7 @@
               <a:t>ordini</a:t>
             </a:r>
             <a:r>
-              <a:rPr lang="en-US" sz="3200">
+              <a:rPr lang="en-US" sz="3200" dirty="0">
                 <a:solidFill>
                   <a:schemeClr val="bg1"/>
                 </a:solidFill>
@@ -18029,7 +18827,7 @@
               <a:t> </a:t>
             </a:r>
             <a:r>
-              <a:rPr lang="en-US" sz="3200" err="1">
+              <a:rPr lang="en-US" sz="3200" dirty="0" err="1">
                 <a:solidFill>
                   <a:schemeClr val="bg1"/>
                 </a:solidFill>
@@ -18038,7 +18836,7 @@
               <a:t>alla</a:t>
             </a:r>
             <a:r>
-              <a:rPr lang="en-US" sz="3200">
+              <a:rPr lang="en-US" sz="3200" dirty="0">
                 <a:solidFill>
                   <a:schemeClr val="bg1"/>
                 </a:solidFill>
@@ -18053,7 +18851,7 @@
               <a:buChar char="•"/>
             </a:pPr>
             <a:r>
-              <a:rPr lang="en-US" sz="3200" err="1">
+              <a:rPr lang="en-US" sz="3200" dirty="0" err="1">
                 <a:solidFill>
                   <a:schemeClr val="bg1"/>
                 </a:solidFill>
@@ -18062,7 +18860,7 @@
               <a:t>Creazione</a:t>
             </a:r>
             <a:r>
-              <a:rPr lang="en-US" sz="3200">
+              <a:rPr lang="en-US" sz="3200" dirty="0">
                 <a:solidFill>
                   <a:schemeClr val="bg1"/>
                 </a:solidFill>
@@ -18071,7 +18869,7 @@
               <a:t> di </a:t>
             </a:r>
             <a:r>
-              <a:rPr lang="en-US" sz="3200" err="1">
+              <a:rPr lang="en-US" sz="3200" dirty="0" err="1">
                 <a:solidFill>
                   <a:schemeClr val="bg1"/>
                 </a:solidFill>
@@ -18080,7 +18878,7 @@
               <a:t>menù</a:t>
             </a:r>
             <a:r>
-              <a:rPr lang="en-US" sz="3200">
+              <a:rPr lang="en-US" sz="3200" dirty="0">
                 <a:solidFill>
                   <a:schemeClr val="bg1"/>
                 </a:solidFill>
@@ -18089,7 +18887,7 @@
               <a:t> </a:t>
             </a:r>
             <a:r>
-              <a:rPr lang="en-US" sz="3200" err="1">
+              <a:rPr lang="en-US" sz="3200" dirty="0" err="1">
                 <a:solidFill>
                   <a:schemeClr val="bg1"/>
                 </a:solidFill>
@@ -18097,7 +18895,7 @@
               </a:rPr>
               <a:t>personalizzati</a:t>
             </a:r>
-            <a:endParaRPr lang="en-US" sz="3200">
+            <a:endParaRPr lang="en-US" sz="3200" dirty="0">
               <a:solidFill>
                 <a:schemeClr val="bg1"/>
               </a:solidFill>
@@ -18110,7 +18908,7 @@
               <a:buChar char="•"/>
             </a:pPr>
             <a:r>
-              <a:rPr lang="en-US" sz="3200" b="1" err="1">
+              <a:rPr lang="en-US" sz="3200" b="1" dirty="0" err="1">
                 <a:solidFill>
                   <a:schemeClr val="accent6"/>
                 </a:solidFill>
@@ -18119,7 +18917,7 @@
               <a:t>Redigere</a:t>
             </a:r>
             <a:r>
-              <a:rPr lang="en-US" sz="3200" b="1">
+              <a:rPr lang="en-US" sz="3200" b="1" dirty="0">
                 <a:solidFill>
                   <a:schemeClr val="accent6"/>
                 </a:solidFill>
@@ -18128,7 +18926,7 @@
               <a:t> </a:t>
             </a:r>
             <a:r>
-              <a:rPr lang="en-US" sz="3200" b="1" err="1">
+              <a:rPr lang="en-US" sz="3200" b="1" dirty="0" err="1">
                 <a:solidFill>
                   <a:schemeClr val="accent6"/>
                 </a:solidFill>
@@ -18137,7 +18935,7 @@
               <a:t>conti</a:t>
             </a:r>
             <a:r>
-              <a:rPr lang="en-US" sz="3200" b="1">
+              <a:rPr lang="en-US" sz="3200" b="1" dirty="0">
                 <a:solidFill>
                   <a:schemeClr val="accent6"/>
                 </a:solidFill>
@@ -18146,7 +18944,7 @@
               <a:t> per un </a:t>
             </a:r>
             <a:r>
-              <a:rPr lang="en-US" sz="3200" b="1" err="1">
+              <a:rPr lang="en-US" sz="3200" b="1" dirty="0" err="1">
                 <a:solidFill>
                   <a:schemeClr val="accent6"/>
                 </a:solidFill>
@@ -18155,7 +18953,7 @@
               <a:t>tavolo</a:t>
             </a:r>
             <a:r>
-              <a:rPr lang="en-US" sz="3200" b="1">
+              <a:rPr lang="en-US" sz="3200" b="1" dirty="0">
                 <a:solidFill>
                   <a:schemeClr val="accent6"/>
                 </a:solidFill>

</xml_diff>